<commit_message>
DG Final Update (#238)
* Updated Undo/Redo Section in DG.

* Edited DG, PPP.

* Updated Section 4.7.

* Edited Appendix H. Corrected message in EntryTimeConstraintsUtil.

* Updated DG.

* Added and edited existing Diagrams.

* Corrected Figure Numbers

* Updated PPP.

* no message
</commit_message>
<xml_diff>
--- a/docs/diagrams/AddEntrySD.pptx
+++ b/docs/diagrams/AddEntrySD.pptx
@@ -208,7 +208,7 @@
           <a:p>
             <a:fld id="{F5CC4B3F-88C1-4FFA-B1B6-F41C21DC6924}" type="datetimeFigureOut">
               <a:rPr lang="en-US" smtClean="0"/>
-              <a:t>4/7/2018</a:t>
+              <a:t>4/15/2018</a:t>
             </a:fld>
             <a:endParaRPr lang="en-US"/>
           </a:p>
@@ -738,7 +738,7 @@
           <a:p>
             <a:fld id="{78C97017-6FC3-485B-9764-EAC9E56C1D49}" type="datetimeFigureOut">
               <a:rPr lang="en-US" smtClean="0"/>
-              <a:t>4/7/2018</a:t>
+              <a:t>4/15/2018</a:t>
             </a:fld>
             <a:endParaRPr lang="en-US"/>
           </a:p>
@@ -906,7 +906,7 @@
           <a:p>
             <a:fld id="{78C97017-6FC3-485B-9764-EAC9E56C1D49}" type="datetimeFigureOut">
               <a:rPr lang="en-US" smtClean="0"/>
-              <a:t>4/7/2018</a:t>
+              <a:t>4/15/2018</a:t>
             </a:fld>
             <a:endParaRPr lang="en-US"/>
           </a:p>
@@ -1084,7 +1084,7 @@
           <a:p>
             <a:fld id="{78C97017-6FC3-485B-9764-EAC9E56C1D49}" type="datetimeFigureOut">
               <a:rPr lang="en-US" smtClean="0"/>
-              <a:t>4/7/2018</a:t>
+              <a:t>4/15/2018</a:t>
             </a:fld>
             <a:endParaRPr lang="en-US"/>
           </a:p>
@@ -1252,7 +1252,7 @@
           <a:p>
             <a:fld id="{78C97017-6FC3-485B-9764-EAC9E56C1D49}" type="datetimeFigureOut">
               <a:rPr lang="en-US" smtClean="0"/>
-              <a:t>4/7/2018</a:t>
+              <a:t>4/15/2018</a:t>
             </a:fld>
             <a:endParaRPr lang="en-US"/>
           </a:p>
@@ -1497,7 +1497,7 @@
           <a:p>
             <a:fld id="{78C97017-6FC3-485B-9764-EAC9E56C1D49}" type="datetimeFigureOut">
               <a:rPr lang="en-US" smtClean="0"/>
-              <a:t>4/7/2018</a:t>
+              <a:t>4/15/2018</a:t>
             </a:fld>
             <a:endParaRPr lang="en-US"/>
           </a:p>
@@ -1782,7 +1782,7 @@
           <a:p>
             <a:fld id="{78C97017-6FC3-485B-9764-EAC9E56C1D49}" type="datetimeFigureOut">
               <a:rPr lang="en-US" smtClean="0"/>
-              <a:t>4/7/2018</a:t>
+              <a:t>4/15/2018</a:t>
             </a:fld>
             <a:endParaRPr lang="en-US"/>
           </a:p>
@@ -2201,7 +2201,7 @@
           <a:p>
             <a:fld id="{78C97017-6FC3-485B-9764-EAC9E56C1D49}" type="datetimeFigureOut">
               <a:rPr lang="en-US" smtClean="0"/>
-              <a:t>4/7/2018</a:t>
+              <a:t>4/15/2018</a:t>
             </a:fld>
             <a:endParaRPr lang="en-US"/>
           </a:p>
@@ -2318,7 +2318,7 @@
           <a:p>
             <a:fld id="{78C97017-6FC3-485B-9764-EAC9E56C1D49}" type="datetimeFigureOut">
               <a:rPr lang="en-US" smtClean="0"/>
-              <a:t>4/7/2018</a:t>
+              <a:t>4/15/2018</a:t>
             </a:fld>
             <a:endParaRPr lang="en-US"/>
           </a:p>
@@ -2413,7 +2413,7 @@
           <a:p>
             <a:fld id="{78C97017-6FC3-485B-9764-EAC9E56C1D49}" type="datetimeFigureOut">
               <a:rPr lang="en-US" smtClean="0"/>
-              <a:t>4/7/2018</a:t>
+              <a:t>4/15/2018</a:t>
             </a:fld>
             <a:endParaRPr lang="en-US"/>
           </a:p>
@@ -2688,7 +2688,7 @@
           <a:p>
             <a:fld id="{78C97017-6FC3-485B-9764-EAC9E56C1D49}" type="datetimeFigureOut">
               <a:rPr lang="en-US" smtClean="0"/>
-              <a:t>4/7/2018</a:t>
+              <a:t>4/15/2018</a:t>
             </a:fld>
             <a:endParaRPr lang="en-US"/>
           </a:p>
@@ -2940,7 +2940,7 @@
           <a:p>
             <a:fld id="{78C97017-6FC3-485B-9764-EAC9E56C1D49}" type="datetimeFigureOut">
               <a:rPr lang="en-US" smtClean="0"/>
-              <a:t>4/7/2018</a:t>
+              <a:t>4/15/2018</a:t>
             </a:fld>
             <a:endParaRPr lang="en-US"/>
           </a:p>
@@ -3151,7 +3151,7 @@
           <a:p>
             <a:fld id="{78C97017-6FC3-485B-9764-EAC9E56C1D49}" type="datetimeFigureOut">
               <a:rPr lang="en-US" smtClean="0"/>
-              <a:t>4/7/2018</a:t>
+              <a:t>4/15/2018</a:t>
             </a:fld>
             <a:endParaRPr lang="en-US"/>
           </a:p>
@@ -4176,7 +4176,23 @@
                   <a:schemeClr val="bg1"/>
                 </a:solidFill>
               </a:rPr>
-              <a:t>ae:AddEvent</a:t>
+              <a:t>ae</a:t>
+            </a:r>
+            <a:r>
+              <a:rPr lang="en-US" sz="1600" err="1">
+                <a:solidFill>
+                  <a:schemeClr val="bg1"/>
+                </a:solidFill>
+              </a:rPr>
+              <a:t>:</a:t>
+            </a:r>
+            <a:r>
+              <a:rPr lang="en-US" sz="1600">
+                <a:solidFill>
+                  <a:schemeClr val="bg1"/>
+                </a:solidFill>
+              </a:rPr>
+              <a:t>AddEntry</a:t>
             </a:r>
             <a:br>
               <a:rPr lang="en-US" sz="1600" dirty="0">
@@ -5271,7 +5287,7 @@
                   <a:schemeClr val="bg1"/>
                 </a:solidFill>
               </a:rPr>
-              <a:t>ae:AddEvent</a:t>
+              <a:t>ae:AddEntry</a:t>
             </a:r>
             <a:br>
               <a:rPr lang="en-US" sz="1200" dirty="0">

</xml_diff>